<commit_message>
tracks in document list
</commit_message>
<xml_diff>
--- a/itrack.pptx
+++ b/itrack.pptx
@@ -238,7 +238,7 @@
           <a:p>
             <a:fld id="{09F1217A-CF6E-4547-9A95-41BA888EE63B}" type="datetimeFigureOut">
               <a:rPr lang="en-PH" smtClean="0"/>
-              <a:t>1/15/2019</a:t>
+              <a:t>16/01/2019</a:t>
             </a:fld>
             <a:endParaRPr lang="en-PH"/>
           </a:p>
@@ -408,7 +408,7 @@
           <a:p>
             <a:fld id="{09F1217A-CF6E-4547-9A95-41BA888EE63B}" type="datetimeFigureOut">
               <a:rPr lang="en-PH" smtClean="0"/>
-              <a:t>1/15/2019</a:t>
+              <a:t>16/01/2019</a:t>
             </a:fld>
             <a:endParaRPr lang="en-PH"/>
           </a:p>
@@ -588,7 +588,7 @@
           <a:p>
             <a:fld id="{09F1217A-CF6E-4547-9A95-41BA888EE63B}" type="datetimeFigureOut">
               <a:rPr lang="en-PH" smtClean="0"/>
-              <a:t>1/15/2019</a:t>
+              <a:t>16/01/2019</a:t>
             </a:fld>
             <a:endParaRPr lang="en-PH"/>
           </a:p>
@@ -758,7 +758,7 @@
           <a:p>
             <a:fld id="{09F1217A-CF6E-4547-9A95-41BA888EE63B}" type="datetimeFigureOut">
               <a:rPr lang="en-PH" smtClean="0"/>
-              <a:t>1/15/2019</a:t>
+              <a:t>16/01/2019</a:t>
             </a:fld>
             <a:endParaRPr lang="en-PH"/>
           </a:p>
@@ -1004,7 +1004,7 @@
           <a:p>
             <a:fld id="{09F1217A-CF6E-4547-9A95-41BA888EE63B}" type="datetimeFigureOut">
               <a:rPr lang="en-PH" smtClean="0"/>
-              <a:t>1/15/2019</a:t>
+              <a:t>16/01/2019</a:t>
             </a:fld>
             <a:endParaRPr lang="en-PH"/>
           </a:p>
@@ -1236,7 +1236,7 @@
           <a:p>
             <a:fld id="{09F1217A-CF6E-4547-9A95-41BA888EE63B}" type="datetimeFigureOut">
               <a:rPr lang="en-PH" smtClean="0"/>
-              <a:t>1/15/2019</a:t>
+              <a:t>16/01/2019</a:t>
             </a:fld>
             <a:endParaRPr lang="en-PH"/>
           </a:p>
@@ -1603,7 +1603,7 @@
           <a:p>
             <a:fld id="{09F1217A-CF6E-4547-9A95-41BA888EE63B}" type="datetimeFigureOut">
               <a:rPr lang="en-PH" smtClean="0"/>
-              <a:t>1/15/2019</a:t>
+              <a:t>16/01/2019</a:t>
             </a:fld>
             <a:endParaRPr lang="en-PH"/>
           </a:p>
@@ -1721,7 +1721,7 @@
           <a:p>
             <a:fld id="{09F1217A-CF6E-4547-9A95-41BA888EE63B}" type="datetimeFigureOut">
               <a:rPr lang="en-PH" smtClean="0"/>
-              <a:t>1/15/2019</a:t>
+              <a:t>16/01/2019</a:t>
             </a:fld>
             <a:endParaRPr lang="en-PH"/>
           </a:p>
@@ -1816,7 +1816,7 @@
           <a:p>
             <a:fld id="{09F1217A-CF6E-4547-9A95-41BA888EE63B}" type="datetimeFigureOut">
               <a:rPr lang="en-PH" smtClean="0"/>
-              <a:t>1/15/2019</a:t>
+              <a:t>16/01/2019</a:t>
             </a:fld>
             <a:endParaRPr lang="en-PH"/>
           </a:p>
@@ -2093,7 +2093,7 @@
           <a:p>
             <a:fld id="{09F1217A-CF6E-4547-9A95-41BA888EE63B}" type="datetimeFigureOut">
               <a:rPr lang="en-PH" smtClean="0"/>
-              <a:t>1/15/2019</a:t>
+              <a:t>16/01/2019</a:t>
             </a:fld>
             <a:endParaRPr lang="en-PH"/>
           </a:p>
@@ -2346,7 +2346,7 @@
           <a:p>
             <a:fld id="{09F1217A-CF6E-4547-9A95-41BA888EE63B}" type="datetimeFigureOut">
               <a:rPr lang="en-PH" smtClean="0"/>
-              <a:t>1/15/2019</a:t>
+              <a:t>16/01/2019</a:t>
             </a:fld>
             <a:endParaRPr lang="en-PH"/>
           </a:p>
@@ -2565,7 +2565,7 @@
           <a:p>
             <a:fld id="{09F1217A-CF6E-4547-9A95-41BA888EE63B}" type="datetimeFigureOut">
               <a:rPr lang="en-PH" smtClean="0"/>
-              <a:t>1/15/2019</a:t>
+              <a:t>16/01/2019</a:t>
             </a:fld>
             <a:endParaRPr lang="en-PH"/>
           </a:p>
@@ -4977,6 +4977,45 @@
           </a:fontRef>
         </p:style>
       </p:cxnSp>
+      <p:sp>
+        <p:nvSpPr>
+          <p:cNvPr id="2" name="TextBox 1"/>
+          <p:cNvSpPr txBox="1"/>
+          <p:nvPr/>
+        </p:nvSpPr>
+        <p:spPr>
+          <a:xfrm>
+            <a:off x="4362027" y="298448"/>
+            <a:ext cx="3480179" cy="707886"/>
+          </a:xfrm>
+          <a:prstGeom prst="rect">
+            <a:avLst/>
+          </a:prstGeom>
+          <a:noFill/>
+        </p:spPr>
+        <p:txBody>
+          <a:bodyPr wrap="square" rtlCol="0">
+            <a:spAutoFit/>
+          </a:bodyPr>
+          <a:lstStyle/>
+          <a:p>
+            <a:pPr algn="ctr"/>
+            <a:r>
+              <a:rPr lang="en-US" sz="4000" dirty="0" smtClean="0">
+                <a:solidFill>
+                  <a:schemeClr val="bg1"/>
+                </a:solidFill>
+              </a:rPr>
+              <a:t>Process Flow</a:t>
+            </a:r>
+            <a:endParaRPr lang="en-US" sz="4000" dirty="0">
+              <a:solidFill>
+                <a:schemeClr val="bg1"/>
+              </a:solidFill>
+            </a:endParaRPr>
+          </a:p>
+        </p:txBody>
+      </p:sp>
     </p:spTree>
     <p:extLst>
       <p:ext uri="{BB962C8B-B14F-4D97-AF65-F5344CB8AC3E}">
@@ -5033,7 +5072,7 @@
     </a:clrScheme>
     <a:fontScheme name="Office">
       <a:majorFont>
-        <a:latin typeface="Calibri Light" panose="020F0302020204030204"/>
+        <a:latin typeface="Calibri Light"/>
         <a:ea typeface=""/>
         <a:cs typeface=""/>
         <a:font script="Jpan" typeface="ＭＳ Ｐゴシック"/>
@@ -5068,7 +5107,7 @@
         <a:font script="Geor" typeface="Sylfaen"/>
       </a:majorFont>
       <a:minorFont>
-        <a:latin typeface="Calibri" panose="020F0502020204030204"/>
+        <a:latin typeface="Calibri"/>
         <a:ea typeface=""/>
         <a:cs typeface=""/>
         <a:font script="Jpan" typeface="ＭＳ Ｐゴシック"/>
@@ -5245,7 +5284,7 @@
   <a:extraClrSchemeLst/>
   <a:extLst>
     <a:ext uri="{05A4C25C-085E-4340-85A3-A5531E510DB2}">
-      <thm15:themeFamily xmlns:thm15="http://schemas.microsoft.com/office/thememl/2012/main" name="Office Theme" id="{62F939B6-93AF-4DB8-9C6B-D6C7DFDC589F}" vid="{4A3C46E8-61CC-4603-A589-7422A47A8E4A}"/>
+      <thm15:themeFamily xmlns:thm15="http://schemas.microsoft.com/office/thememl/2012/main" xmlns="" name="Office Theme" id="{62F939B6-93AF-4DB8-9C6B-D6C7DFDC589F}" vid="{4A3C46E8-61CC-4603-A589-7422A47A8E4A}"/>
     </a:ext>
   </a:extLst>
 </a:theme>

</xml_diff>